<commit_message>
Status Friday 3:10pm. Mapping in second tranche of indicators (cell subscription, life expectancy, employment by sector)
</commit_message>
<xml_diff>
--- a/presentation/World_Values_Short_v00.1.pptx
+++ b/presentation/World_Values_Short_v00.1.pptx
@@ -200,7 +200,7 @@
             <a:fld id="{5F9494A3-C453-0B41-A3B0-EEADEB3D1504}" type="datetimeFigureOut">
               <a:rPr lang="en-US" smtClean="0"/>
               <a:pPr/>
-              <a:t>7/12/18</a:t>
+              <a:t>7/13/18</a:t>
             </a:fld>
             <a:endParaRPr lang="en-US"/>
           </a:p>
@@ -596,6 +596,122 @@
 </p:notes>
 </file>
 
+<file path=ppt/notesSlides/notesSlide2.xml><?xml version="1.0" encoding="utf-8"?>
+<p:notes xmlns:a="http://schemas.openxmlformats.org/drawingml/2006/main" xmlns:r="http://schemas.openxmlformats.org/officeDocument/2006/relationships" xmlns:mc="http://schemas.openxmlformats.org/markup-compatibility/2006" xmlns:mv="urn:schemas-microsoft-com:mac:vml" xmlns:p="http://schemas.openxmlformats.org/presentationml/2006/main" mc:Ignorable="mv" mc:PreserveAttributes="mv:*">
+  <p:cSld>
+    <p:spTree>
+      <p:nvGrpSpPr>
+        <p:cNvPr id="1" name=""/>
+        <p:cNvGrpSpPr/>
+        <p:nvPr/>
+      </p:nvGrpSpPr>
+      <p:grpSpPr>
+        <a:xfrm>
+          <a:off x="0" y="0"/>
+          <a:ext cx="0" cy="0"/>
+          <a:chOff x="0" y="0"/>
+          <a:chExt cx="0" cy="0"/>
+        </a:xfrm>
+      </p:grpSpPr>
+      <p:sp>
+        <p:nvSpPr>
+          <p:cNvPr id="2" name="Slide Image Placeholder 1"/>
+          <p:cNvSpPr>
+            <a:spLocks noGrp="1" noRot="1" noChangeAspect="1"/>
+          </p:cNvSpPr>
+          <p:nvPr>
+            <p:ph type="sldImg"/>
+          </p:nvPr>
+        </p:nvSpPr>
+        <p:spPr/>
+      </p:sp>
+      <p:sp>
+        <p:nvSpPr>
+          <p:cNvPr id="3" name="Notes Placeholder 2"/>
+          <p:cNvSpPr>
+            <a:spLocks noGrp="1"/>
+          </p:cNvSpPr>
+          <p:nvPr>
+            <p:ph type="body" idx="1"/>
+          </p:nvPr>
+        </p:nvSpPr>
+        <p:spPr/>
+        <p:txBody>
+          <a:bodyPr>
+            <a:normAutofit/>
+          </a:bodyPr>
+          <a:lstStyle/>
+          <a:p>
+            <a:r>
+              <a:rPr lang="en-US" dirty="0" smtClean="0"/>
+              <a:t>Feature engineering :</a:t>
+            </a:r>
+          </a:p>
+          <a:p>
+            <a:pPr>
+              <a:buFontTx/>
+              <a:buChar char="-"/>
+            </a:pPr>
+            <a:r>
+              <a:rPr lang="en-US" baseline="0" dirty="0" smtClean="0"/>
+              <a:t>Lifestyle – hours, holidays, pressure</a:t>
+            </a:r>
+          </a:p>
+          <a:p>
+            <a:pPr>
+              <a:buFontTx/>
+              <a:buChar char="-"/>
+            </a:pPr>
+            <a:r>
+              <a:rPr lang="en-US" baseline="0" dirty="0" smtClean="0"/>
+              <a:t> Achievement – initiative, achievement, responsible</a:t>
+            </a:r>
+          </a:p>
+          <a:p>
+            <a:pPr>
+              <a:buFontTx/>
+              <a:buChar char="-"/>
+            </a:pPr>
+            <a:r>
+              <a:rPr lang="en-US" baseline="0" dirty="0" smtClean="0"/>
+              <a:t> Income security – security, pay</a:t>
+            </a:r>
+            <a:endParaRPr lang="en-US" dirty="0"/>
+          </a:p>
+        </p:txBody>
+      </p:sp>
+      <p:sp>
+        <p:nvSpPr>
+          <p:cNvPr id="4" name="Slide Number Placeholder 3"/>
+          <p:cNvSpPr>
+            <a:spLocks noGrp="1"/>
+          </p:cNvSpPr>
+          <p:nvPr>
+            <p:ph type="sldNum" sz="quarter" idx="10"/>
+          </p:nvPr>
+        </p:nvSpPr>
+        <p:spPr/>
+        <p:txBody>
+          <a:bodyPr/>
+          <a:lstStyle/>
+          <a:p>
+            <a:fld id="{93A47183-C44D-9C46-B545-85537CE655A7}" type="slidenum">
+              <a:rPr lang="en-US" smtClean="0"/>
+              <a:pPr/>
+              <a:t>6</a:t>
+            </a:fld>
+            <a:endParaRPr lang="en-US"/>
+          </a:p>
+        </p:txBody>
+      </p:sp>
+    </p:spTree>
+  </p:cSld>
+  <p:clrMapOvr>
+    <a:masterClrMapping/>
+  </p:clrMapOvr>
+</p:notes>
+</file>
+
 <file path=ppt/slideLayouts/slideLayout1.xml><?xml version="1.0" encoding="utf-8"?>
 <p:sldLayout xmlns:a="http://schemas.openxmlformats.org/drawingml/2006/main" xmlns:r="http://schemas.openxmlformats.org/officeDocument/2006/relationships" xmlns:mc="http://schemas.openxmlformats.org/markup-compatibility/2006" xmlns:mv="urn:schemas-microsoft-com:mac:vml" xmlns:p="http://schemas.openxmlformats.org/presentationml/2006/main" mc:Ignorable="mv" mc:PreserveAttributes="mv:*" type="title" preserve="1">
   <p:cSld name="Title Slide">
@@ -778,7 +894,7 @@
             <a:fld id="{E22E9FE5-7402-3C46-B200-50E1728FC1AF}" type="datetimeFigureOut">
               <a:rPr lang="en-US" smtClean="0"/>
               <a:pPr/>
-              <a:t>7/12/18</a:t>
+              <a:t>7/13/18</a:t>
             </a:fld>
             <a:endParaRPr lang="en-US"/>
           </a:p>
@@ -945,7 +1061,7 @@
             <a:fld id="{E22E9FE5-7402-3C46-B200-50E1728FC1AF}" type="datetimeFigureOut">
               <a:rPr lang="en-US" smtClean="0"/>
               <a:pPr/>
-              <a:t>7/12/18</a:t>
+              <a:t>7/13/18</a:t>
             </a:fld>
             <a:endParaRPr lang="en-US"/>
           </a:p>
@@ -1122,7 +1238,7 @@
             <a:fld id="{E22E9FE5-7402-3C46-B200-50E1728FC1AF}" type="datetimeFigureOut">
               <a:rPr lang="en-US" smtClean="0"/>
               <a:pPr/>
-              <a:t>7/12/18</a:t>
+              <a:t>7/13/18</a:t>
             </a:fld>
             <a:endParaRPr lang="en-US"/>
           </a:p>
@@ -1289,7 +1405,7 @@
             <a:fld id="{E22E9FE5-7402-3C46-B200-50E1728FC1AF}" type="datetimeFigureOut">
               <a:rPr lang="en-US" smtClean="0"/>
               <a:pPr/>
-              <a:t>7/12/18</a:t>
+              <a:t>7/13/18</a:t>
             </a:fld>
             <a:endParaRPr lang="en-US"/>
           </a:p>
@@ -1532,7 +1648,7 @@
             <a:fld id="{E22E9FE5-7402-3C46-B200-50E1728FC1AF}" type="datetimeFigureOut">
               <a:rPr lang="en-US" smtClean="0"/>
               <a:pPr/>
-              <a:t>7/12/18</a:t>
+              <a:t>7/13/18</a:t>
             </a:fld>
             <a:endParaRPr lang="en-US"/>
           </a:p>
@@ -1817,7 +1933,7 @@
             <a:fld id="{E22E9FE5-7402-3C46-B200-50E1728FC1AF}" type="datetimeFigureOut">
               <a:rPr lang="en-US" smtClean="0"/>
               <a:pPr/>
-              <a:t>7/12/18</a:t>
+              <a:t>7/13/18</a:t>
             </a:fld>
             <a:endParaRPr lang="en-US"/>
           </a:p>
@@ -2236,7 +2352,7 @@
             <a:fld id="{E22E9FE5-7402-3C46-B200-50E1728FC1AF}" type="datetimeFigureOut">
               <a:rPr lang="en-US" smtClean="0"/>
               <a:pPr/>
-              <a:t>7/12/18</a:t>
+              <a:t>7/13/18</a:t>
             </a:fld>
             <a:endParaRPr lang="en-US"/>
           </a:p>
@@ -2351,7 +2467,7 @@
             <a:fld id="{E22E9FE5-7402-3C46-B200-50E1728FC1AF}" type="datetimeFigureOut">
               <a:rPr lang="en-US" smtClean="0"/>
               <a:pPr/>
-              <a:t>7/12/18</a:t>
+              <a:t>7/13/18</a:t>
             </a:fld>
             <a:endParaRPr lang="en-US"/>
           </a:p>
@@ -2443,7 +2559,7 @@
             <a:fld id="{E22E9FE5-7402-3C46-B200-50E1728FC1AF}" type="datetimeFigureOut">
               <a:rPr lang="en-US" smtClean="0"/>
               <a:pPr/>
-              <a:t>7/12/18</a:t>
+              <a:t>7/13/18</a:t>
             </a:fld>
             <a:endParaRPr lang="en-US"/>
           </a:p>
@@ -2717,7 +2833,7 @@
             <a:fld id="{E22E9FE5-7402-3C46-B200-50E1728FC1AF}" type="datetimeFigureOut">
               <a:rPr lang="en-US" smtClean="0"/>
               <a:pPr/>
-              <a:t>7/12/18</a:t>
+              <a:t>7/13/18</a:t>
             </a:fld>
             <a:endParaRPr lang="en-US"/>
           </a:p>
@@ -2967,7 +3083,7 @@
             <a:fld id="{E22E9FE5-7402-3C46-B200-50E1728FC1AF}" type="datetimeFigureOut">
               <a:rPr lang="en-US" smtClean="0"/>
               <a:pPr/>
-              <a:t>7/12/18</a:t>
+              <a:t>7/13/18</a:t>
             </a:fld>
             <a:endParaRPr lang="en-US"/>
           </a:p>
@@ -3177,7 +3293,7 @@
             <a:fld id="{E22E9FE5-7402-3C46-B200-50E1728FC1AF}" type="datetimeFigureOut">
               <a:rPr lang="en-US" smtClean="0"/>
               <a:pPr/>
-              <a:t>7/12/18</a:t>
+              <a:t>7/13/18</a:t>
             </a:fld>
             <a:endParaRPr lang="en-US"/>
           </a:p>
@@ -4043,11 +4159,7 @@
             </a:pPr>
             <a:r>
               <a:rPr lang="en-US" sz="2800" dirty="0" smtClean="0"/>
-              <a:t>Gap Minder Political Indicators – Democracy </a:t>
-            </a:r>
-            <a:r>
-              <a:rPr lang="en-US" sz="2800" dirty="0" smtClean="0"/>
-              <a:t>Index</a:t>
+              <a:t>Gap Minder Political Indicators – Democracy Index</a:t>
             </a:r>
             <a:endParaRPr lang="en-US" sz="2800" dirty="0"/>
           </a:p>
@@ -4155,7 +4267,7 @@
           <p:nvPr/>
         </p:nvPicPr>
         <p:blipFill>
-          <a:blip r:embed="rId2"/>
+          <a:blip r:embed="rId3"/>
           <a:stretch>
             <a:fillRect/>
           </a:stretch>
@@ -4257,11 +4369,7 @@
             </a:r>
             <a:r>
               <a:rPr lang="en-US" sz="2800" dirty="0" smtClean="0"/>
-              <a:t>influence a country's values system?</a:t>
-            </a:r>
-            <a:r>
-              <a:rPr lang="en-US" sz="2800" dirty="0" smtClean="0"/>
-              <a:t> </a:t>
+              <a:t>influence a country's values system? </a:t>
             </a:r>
           </a:p>
           <a:p>
@@ -4340,7 +4448,15 @@
             </a:r>
             <a:r>
               <a:rPr lang="en-US" sz="2800" dirty="0" smtClean="0"/>
-              <a:t>of the variance among groups</a:t>
+              <a:t>of the variance among </a:t>
+            </a:r>
+            <a:r>
+              <a:rPr lang="en-US" sz="2800" dirty="0" smtClean="0"/>
+              <a:t>groups in terms of “responsibility” </a:t>
+            </a:r>
+            <a:r>
+              <a:rPr lang="en-US" sz="2800" dirty="0" smtClean="0"/>
+              <a:t>value</a:t>
             </a:r>
             <a:endParaRPr lang="en-US" sz="2800" dirty="0"/>
           </a:p>
@@ -4413,11 +4529,7 @@
           <a:p>
             <a:r>
               <a:rPr lang="en-US" b="1" dirty="0" smtClean="0"/>
-              <a:t>a) What different values systems exist</a:t>
-            </a:r>
-            <a:r>
-              <a:rPr lang="en-US" b="1" dirty="0" smtClean="0"/>
-              <a:t> </a:t>
+              <a:t>a) What different values systems exist </a:t>
             </a:r>
             <a:r>
               <a:rPr lang="en-US" dirty="0" smtClean="0"/>
@@ -4442,18 +4554,18 @@
             </a:r>
             <a:r>
               <a:rPr lang="en-US" dirty="0" smtClean="0"/>
-              <a:t>rs influence a country's values system?</a:t>
-            </a:r>
+              <a:t>rs influence a country's values system? </a:t>
+            </a:r>
+          </a:p>
+          <a:p>
+            <a:pPr lvl="1"/>
             <a:r>
               <a:rPr lang="en-US" dirty="0" smtClean="0"/>
-              <a:t> </a:t>
-            </a:r>
-          </a:p>
-          <a:p>
-            <a:pPr lvl="1"/>
+              <a:t>GDP, GINI, Education and Democracy explain 30% of the </a:t>
+            </a:r>
             <a:r>
               <a:rPr lang="en-US" dirty="0" smtClean="0"/>
-              <a:t>GDP, GINI, Education and Democracy explain 30% of the variance</a:t>
+              <a:t>variance of “responsibility” value</a:t>
             </a:r>
           </a:p>
           <a:p>
@@ -4464,7 +4576,11 @@
             </a:r>
             <a:r>
               <a:rPr lang="en-US" dirty="0" smtClean="0"/>
-              <a:t>dive into relative importance</a:t>
+              <a:t>dive into</a:t>
+            </a:r>
+            <a:r>
+              <a:rPr lang="en-US" dirty="0" smtClean="0"/>
+              <a:t> income security and lifestyle</a:t>
             </a:r>
             <a:endParaRPr lang="en-US" i="1" dirty="0" smtClean="0"/>
           </a:p>
@@ -4479,11 +4595,7 @@
             </a:r>
             <a:r>
               <a:rPr lang="en-US" dirty="0" smtClean="0"/>
-              <a:t>a country's values system, based on these factors</a:t>
-            </a:r>
-            <a:r>
-              <a:rPr lang="en-US" dirty="0" smtClean="0"/>
-              <a:t>?</a:t>
+              <a:t>a country's values system, based on these factors?</a:t>
             </a:r>
           </a:p>
           <a:p>

</xml_diff>